<commit_message>
new file:   pbo-si-2/CalonMahasiswa.php new file:   pbo-si-2/Chield.php 	modified:   pbo-si-2/Mahasiswa.php new file:   pbo-si-2/Parentc.php 	modified:   pbo-si-2/program_03.php new file:   pbo-si-2/program_05.php new file:   pbo-si-2/program_06.php new file:   praktik-pbo-si-2/Angka.php new file:   praktik-pbo-si-2/CalonMahasiswaExtendsMahasiswa.jpg new file:   praktik-pbo-si-2/progAngka.php
</commit_message>
<xml_diff>
--- a/pbo-si-2/Presentation2.pptx
+++ b/pbo-si-2/Presentation2.pptx
@@ -290,7 +290,8 @@
           <a:p>
             <a:fld id="{D65F8FF6-1E18-4395-98AD-D6A95F9D5B9A}" type="datetimeFigureOut">
               <a:rPr lang="id-ID" smtClean="0"/>
-              <a:t>12/03/2019</a:t>
+              <a:pPr/>
+              <a:t>19/03/2019</a:t>
             </a:fld>
             <a:endParaRPr lang="id-ID"/>
           </a:p>
@@ -332,6 +333,7 @@
           <a:p>
             <a:fld id="{EBC1B326-2968-4359-87F2-0D61CBD1D9E4}" type="slidenum">
               <a:rPr lang="id-ID" smtClean="0"/>
+              <a:pPr/>
               <a:t>‹#›</a:t>
             </a:fld>
             <a:endParaRPr lang="id-ID"/>
@@ -455,7 +457,8 @@
           <a:p>
             <a:fld id="{D65F8FF6-1E18-4395-98AD-D6A95F9D5B9A}" type="datetimeFigureOut">
               <a:rPr lang="id-ID" smtClean="0"/>
-              <a:t>12/03/2019</a:t>
+              <a:pPr/>
+              <a:t>19/03/2019</a:t>
             </a:fld>
             <a:endParaRPr lang="id-ID"/>
           </a:p>
@@ -497,6 +500,7 @@
           <a:p>
             <a:fld id="{EBC1B326-2968-4359-87F2-0D61CBD1D9E4}" type="slidenum">
               <a:rPr lang="id-ID" smtClean="0"/>
+              <a:pPr/>
               <a:t>‹#›</a:t>
             </a:fld>
             <a:endParaRPr lang="id-ID"/>
@@ -630,7 +634,8 @@
           <a:p>
             <a:fld id="{D65F8FF6-1E18-4395-98AD-D6A95F9D5B9A}" type="datetimeFigureOut">
               <a:rPr lang="id-ID" smtClean="0"/>
-              <a:t>12/03/2019</a:t>
+              <a:pPr/>
+              <a:t>19/03/2019</a:t>
             </a:fld>
             <a:endParaRPr lang="id-ID"/>
           </a:p>
@@ -672,6 +677,7 @@
           <a:p>
             <a:fld id="{EBC1B326-2968-4359-87F2-0D61CBD1D9E4}" type="slidenum">
               <a:rPr lang="id-ID" smtClean="0"/>
+              <a:pPr/>
               <a:t>‹#›</a:t>
             </a:fld>
             <a:endParaRPr lang="id-ID"/>
@@ -795,7 +801,8 @@
           <a:p>
             <a:fld id="{D65F8FF6-1E18-4395-98AD-D6A95F9D5B9A}" type="datetimeFigureOut">
               <a:rPr lang="id-ID" smtClean="0"/>
-              <a:t>12/03/2019</a:t>
+              <a:pPr/>
+              <a:t>19/03/2019</a:t>
             </a:fld>
             <a:endParaRPr lang="id-ID"/>
           </a:p>
@@ -837,6 +844,7 @@
           <a:p>
             <a:fld id="{EBC1B326-2968-4359-87F2-0D61CBD1D9E4}" type="slidenum">
               <a:rPr lang="id-ID" smtClean="0"/>
+              <a:pPr/>
               <a:t>‹#›</a:t>
             </a:fld>
             <a:endParaRPr lang="id-ID"/>
@@ -1036,7 +1044,8 @@
           <a:p>
             <a:fld id="{D65F8FF6-1E18-4395-98AD-D6A95F9D5B9A}" type="datetimeFigureOut">
               <a:rPr lang="id-ID" smtClean="0"/>
-              <a:t>12/03/2019</a:t>
+              <a:pPr/>
+              <a:t>19/03/2019</a:t>
             </a:fld>
             <a:endParaRPr lang="id-ID"/>
           </a:p>
@@ -1078,6 +1087,7 @@
           <a:p>
             <a:fld id="{EBC1B326-2968-4359-87F2-0D61CBD1D9E4}" type="slidenum">
               <a:rPr lang="id-ID" smtClean="0"/>
+              <a:pPr/>
               <a:t>‹#›</a:t>
             </a:fld>
             <a:endParaRPr lang="id-ID"/>
@@ -1319,7 +1329,8 @@
           <a:p>
             <a:fld id="{D65F8FF6-1E18-4395-98AD-D6A95F9D5B9A}" type="datetimeFigureOut">
               <a:rPr lang="id-ID" smtClean="0"/>
-              <a:t>12/03/2019</a:t>
+              <a:pPr/>
+              <a:t>19/03/2019</a:t>
             </a:fld>
             <a:endParaRPr lang="id-ID"/>
           </a:p>
@@ -1361,6 +1372,7 @@
           <a:p>
             <a:fld id="{EBC1B326-2968-4359-87F2-0D61CBD1D9E4}" type="slidenum">
               <a:rPr lang="id-ID" smtClean="0"/>
+              <a:pPr/>
               <a:t>‹#›</a:t>
             </a:fld>
             <a:endParaRPr lang="id-ID"/>
@@ -1736,7 +1748,8 @@
           <a:p>
             <a:fld id="{D65F8FF6-1E18-4395-98AD-D6A95F9D5B9A}" type="datetimeFigureOut">
               <a:rPr lang="id-ID" smtClean="0"/>
-              <a:t>12/03/2019</a:t>
+              <a:pPr/>
+              <a:t>19/03/2019</a:t>
             </a:fld>
             <a:endParaRPr lang="id-ID"/>
           </a:p>
@@ -1778,6 +1791,7 @@
           <a:p>
             <a:fld id="{EBC1B326-2968-4359-87F2-0D61CBD1D9E4}" type="slidenum">
               <a:rPr lang="id-ID" smtClean="0"/>
+              <a:pPr/>
               <a:t>‹#›</a:t>
             </a:fld>
             <a:endParaRPr lang="id-ID"/>
@@ -1849,7 +1863,8 @@
           <a:p>
             <a:fld id="{D65F8FF6-1E18-4395-98AD-D6A95F9D5B9A}" type="datetimeFigureOut">
               <a:rPr lang="id-ID" smtClean="0"/>
-              <a:t>12/03/2019</a:t>
+              <a:pPr/>
+              <a:t>19/03/2019</a:t>
             </a:fld>
             <a:endParaRPr lang="id-ID"/>
           </a:p>
@@ -1891,6 +1906,7 @@
           <a:p>
             <a:fld id="{EBC1B326-2968-4359-87F2-0D61CBD1D9E4}" type="slidenum">
               <a:rPr lang="id-ID" smtClean="0"/>
+              <a:pPr/>
               <a:t>‹#›</a:t>
             </a:fld>
             <a:endParaRPr lang="id-ID"/>
@@ -1939,7 +1955,8 @@
           <a:p>
             <a:fld id="{D65F8FF6-1E18-4395-98AD-D6A95F9D5B9A}" type="datetimeFigureOut">
               <a:rPr lang="id-ID" smtClean="0"/>
-              <a:t>12/03/2019</a:t>
+              <a:pPr/>
+              <a:t>19/03/2019</a:t>
             </a:fld>
             <a:endParaRPr lang="id-ID"/>
           </a:p>
@@ -1981,6 +1998,7 @@
           <a:p>
             <a:fld id="{EBC1B326-2968-4359-87F2-0D61CBD1D9E4}" type="slidenum">
               <a:rPr lang="id-ID" smtClean="0"/>
+              <a:pPr/>
               <a:t>‹#›</a:t>
             </a:fld>
             <a:endParaRPr lang="id-ID"/>
@@ -2211,7 +2229,8 @@
           <a:p>
             <a:fld id="{D65F8FF6-1E18-4395-98AD-D6A95F9D5B9A}" type="datetimeFigureOut">
               <a:rPr lang="id-ID" smtClean="0"/>
-              <a:t>12/03/2019</a:t>
+              <a:pPr/>
+              <a:t>19/03/2019</a:t>
             </a:fld>
             <a:endParaRPr lang="id-ID"/>
           </a:p>
@@ -2253,6 +2272,7 @@
           <a:p>
             <a:fld id="{EBC1B326-2968-4359-87F2-0D61CBD1D9E4}" type="slidenum">
               <a:rPr lang="id-ID" smtClean="0"/>
+              <a:pPr/>
               <a:t>‹#›</a:t>
             </a:fld>
             <a:endParaRPr lang="id-ID"/>
@@ -2459,7 +2479,8 @@
           <a:p>
             <a:fld id="{D65F8FF6-1E18-4395-98AD-D6A95F9D5B9A}" type="datetimeFigureOut">
               <a:rPr lang="id-ID" smtClean="0"/>
-              <a:t>12/03/2019</a:t>
+              <a:pPr/>
+              <a:t>19/03/2019</a:t>
             </a:fld>
             <a:endParaRPr lang="id-ID"/>
           </a:p>
@@ -2501,6 +2522,7 @@
           <a:p>
             <a:fld id="{EBC1B326-2968-4359-87F2-0D61CBD1D9E4}" type="slidenum">
               <a:rPr lang="id-ID" smtClean="0"/>
+              <a:pPr/>
               <a:t>‹#›</a:t>
             </a:fld>
             <a:endParaRPr lang="id-ID"/>
@@ -2667,7 +2689,8 @@
           <a:p>
             <a:fld id="{D65F8FF6-1E18-4395-98AD-D6A95F9D5B9A}" type="datetimeFigureOut">
               <a:rPr lang="id-ID" smtClean="0"/>
-              <a:t>12/03/2019</a:t>
+              <a:pPr/>
+              <a:t>19/03/2019</a:t>
             </a:fld>
             <a:endParaRPr lang="id-ID"/>
           </a:p>
@@ -2745,6 +2768,7 @@
           <a:p>
             <a:fld id="{EBC1B326-2968-4359-87F2-0D61CBD1D9E4}" type="slidenum">
               <a:rPr lang="id-ID" smtClean="0"/>
+              <a:pPr/>
               <a:t>‹#›</a:t>
             </a:fld>
             <a:endParaRPr lang="id-ID"/>
@@ -3100,25 +3124,6 @@
           <a:chExt cx="0" cy="0"/>
         </a:xfrm>
       </p:grpSpPr>
-      <p:sp>
-        <p:nvSpPr>
-          <p:cNvPr id="2" name="Title 1"/>
-          <p:cNvSpPr>
-            <a:spLocks noGrp="1"/>
-          </p:cNvSpPr>
-          <p:nvPr>
-            <p:ph type="title"/>
-          </p:nvPr>
-        </p:nvSpPr>
-        <p:spPr/>
-        <p:txBody>
-          <a:bodyPr/>
-          <a:lstStyle/>
-          <a:p>
-            <a:endParaRPr lang="id-ID"/>
-          </a:p>
-        </p:txBody>
-      </p:sp>
       <p:graphicFrame>
         <p:nvGraphicFramePr>
           <p:cNvPr id="4" name="Content Placeholder 3"/>
@@ -3130,8 +3135,8 @@
           </p:nvPr>
         </p:nvGraphicFramePr>
         <p:xfrm>
-          <a:off x="457200" y="1600200"/>
-          <a:ext cx="5410944" cy="3688080"/>
+          <a:off x="611560" y="332656"/>
+          <a:ext cx="3744416" cy="2956560"/>
         </p:xfrm>
         <a:graphic>
           <a:graphicData uri="http://schemas.openxmlformats.org/drawingml/2006/table">
@@ -3140,9 +3145,9 @@
                 <a:tableStyleId>{5940675A-B579-460E-94D1-54222C63F5DA}</a:tableStyleId>
               </a:tblPr>
               <a:tblGrid>
-                <a:gridCol w="5410944"/>
+                <a:gridCol w="3744416"/>
               </a:tblGrid>
-              <a:tr h="370840">
+              <a:tr h="358107">
                 <a:tc>
                   <a:txBody>
                     <a:bodyPr/>
@@ -3150,23 +3155,23 @@
                     <a:p>
                       <a:pPr algn="ctr"/>
                       <a:r>
-                        <a:rPr lang="id-ID" sz="2800" dirty="0" smtClean="0"/>
+                        <a:rPr lang="id-ID" sz="2200" dirty="0" smtClean="0"/>
                         <a:t>Mahasiswa</a:t>
                       </a:r>
-                      <a:endParaRPr lang="id-ID" sz="2800" dirty="0"/>
+                      <a:endParaRPr lang="id-ID" sz="2200" dirty="0"/>
                     </a:p>
                   </a:txBody>
                   <a:tcPr/>
                 </a:tc>
               </a:tr>
-              <a:tr h="370840">
+              <a:tr h="947931">
                 <a:tc>
                   <a:txBody>
                     <a:bodyPr/>
                     <a:lstStyle/>
                     <a:p>
                       <a:r>
-                        <a:rPr lang="id-ID" sz="2800" dirty="0" smtClean="0"/>
+                        <a:rPr lang="id-ID" sz="2200" dirty="0" smtClean="0"/>
                         <a:t>- nim : string</a:t>
                       </a:r>
                     </a:p>
@@ -3176,50 +3181,50 @@
                         <a:buChar char="-"/>
                       </a:pPr>
                       <a:r>
-                        <a:rPr lang="id-ID" sz="2800" dirty="0" smtClean="0"/>
+                        <a:rPr lang="id-ID" sz="2200" dirty="0" smtClean="0"/>
                         <a:t> nama : string</a:t>
                       </a:r>
                     </a:p>
                     <a:p>
                       <a:r>
-                        <a:rPr lang="id-ID" sz="2800" dirty="0" smtClean="0"/>
+                        <a:rPr lang="id-ID" sz="2200" dirty="0" smtClean="0"/>
                         <a:t>- alamat : string</a:t>
                       </a:r>
-                      <a:endParaRPr lang="id-ID" sz="2800" dirty="0"/>
+                      <a:endParaRPr lang="id-ID" sz="2200" dirty="0"/>
                     </a:p>
                   </a:txBody>
                   <a:tcPr/>
                 </a:tc>
               </a:tr>
-              <a:tr h="370840">
+              <a:tr h="1242842">
                 <a:tc>
                   <a:txBody>
                     <a:bodyPr/>
                     <a:lstStyle/>
                     <a:p>
                       <a:r>
-                        <a:rPr lang="id-ID" sz="2800" dirty="0" smtClean="0"/>
+                        <a:rPr lang="id-ID" sz="2200" dirty="0" smtClean="0"/>
                         <a:t>+ __construct()</a:t>
                       </a:r>
                     </a:p>
                     <a:p>
                       <a:r>
-                        <a:rPr lang="id-ID" sz="2800" dirty="0" smtClean="0"/>
+                        <a:rPr lang="id-ID" sz="2200" dirty="0" smtClean="0"/>
                         <a:t>+ getNim() : string</a:t>
                       </a:r>
                     </a:p>
                     <a:p>
                       <a:r>
-                        <a:rPr lang="id-ID" sz="2800" dirty="0" smtClean="0"/>
+                        <a:rPr lang="id-ID" sz="2200" dirty="0" smtClean="0"/>
                         <a:t>+ getNama() : string</a:t>
                       </a:r>
                     </a:p>
                     <a:p>
                       <a:r>
-                        <a:rPr lang="id-ID" sz="2800" dirty="0" smtClean="0"/>
+                        <a:rPr lang="id-ID" sz="2200" dirty="0" smtClean="0"/>
                         <a:t>+ getAlamat() : string</a:t>
                       </a:r>
-                      <a:endParaRPr lang="id-ID" sz="2800" dirty="0"/>
+                      <a:endParaRPr lang="id-ID" sz="2200" dirty="0"/>
                     </a:p>
                   </a:txBody>
                   <a:tcPr/>
@@ -3229,6 +3234,176 @@
           </a:graphicData>
         </a:graphic>
       </p:graphicFrame>
+      <p:graphicFrame>
+        <p:nvGraphicFramePr>
+          <p:cNvPr id="5" name="Content Placeholder 3"/>
+          <p:cNvGraphicFramePr>
+            <a:graphicFrameLocks noGrp="1"/>
+          </p:cNvGraphicFramePr>
+          <p:nvPr>
+            <p:ph idx="1"/>
+          </p:nvPr>
+        </p:nvGraphicFramePr>
+        <p:xfrm>
+          <a:off x="2339752" y="4653136"/>
+          <a:ext cx="3744416" cy="1754923"/>
+        </p:xfrm>
+        <a:graphic>
+          <a:graphicData uri="http://schemas.openxmlformats.org/drawingml/2006/table">
+            <a:tbl>
+              <a:tblPr firstRow="1" bandRow="1">
+                <a:tableStyleId>{5940675A-B579-460E-94D1-54222C63F5DA}</a:tableStyleId>
+              </a:tblPr>
+              <a:tblGrid>
+                <a:gridCol w="3744416"/>
+              </a:tblGrid>
+              <a:tr h="377350">
+                <a:tc>
+                  <a:txBody>
+                    <a:bodyPr/>
+                    <a:lstStyle/>
+                    <a:p>
+                      <a:pPr algn="ctr"/>
+                      <a:r>
+                        <a:rPr lang="id-ID" sz="2200" dirty="0" smtClean="0"/>
+                        <a:t>CalonMahasiswa</a:t>
+                      </a:r>
+                      <a:endParaRPr lang="id-ID" sz="2200" dirty="0"/>
+                    </a:p>
+                  </a:txBody>
+                  <a:tcPr/>
+                </a:tc>
+              </a:tr>
+              <a:tr h="377350">
+                <a:tc>
+                  <a:txBody>
+                    <a:bodyPr/>
+                    <a:lstStyle/>
+                    <a:p>
+                      <a:r>
+                        <a:rPr lang="id-ID" sz="2200" dirty="0" smtClean="0"/>
+                        <a:t>- </a:t>
+                      </a:r>
+                      <a:r>
+                        <a:rPr lang="id-ID" sz="2200" dirty="0" smtClean="0"/>
+                        <a:t>sekolahAsal : string</a:t>
+                      </a:r>
+                      <a:endParaRPr lang="id-ID" sz="2200" dirty="0"/>
+                    </a:p>
+                  </a:txBody>
+                  <a:tcPr/>
+                </a:tc>
+              </a:tr>
+              <a:tr h="901483">
+                <a:tc>
+                  <a:txBody>
+                    <a:bodyPr/>
+                    <a:lstStyle/>
+                    <a:p>
+                      <a:r>
+                        <a:rPr lang="id-ID" sz="2200" dirty="0" smtClean="0"/>
+                        <a:t>+ __construct()</a:t>
+                      </a:r>
+                    </a:p>
+                    <a:p>
+                      <a:r>
+                        <a:rPr lang="id-ID" sz="2200" dirty="0" smtClean="0"/>
+                        <a:t>+ </a:t>
+                      </a:r>
+                      <a:r>
+                        <a:rPr lang="id-ID" sz="2200" dirty="0" smtClean="0"/>
+                        <a:t>getSekolahAsal() </a:t>
+                      </a:r>
+                      <a:r>
+                        <a:rPr lang="id-ID" sz="2200" dirty="0" smtClean="0"/>
+                        <a:t>: </a:t>
+                      </a:r>
+                      <a:r>
+                        <a:rPr lang="id-ID" sz="2200" dirty="0" smtClean="0"/>
+                        <a:t>string</a:t>
+                      </a:r>
+                      <a:endParaRPr lang="id-ID" sz="2200" dirty="0" smtClean="0"/>
+                    </a:p>
+                  </a:txBody>
+                  <a:tcPr/>
+                </a:tc>
+              </a:tr>
+            </a:tbl>
+          </a:graphicData>
+        </a:graphic>
+      </p:graphicFrame>
+      <p:sp>
+        <p:nvSpPr>
+          <p:cNvPr id="6" name="Isosceles Triangle 5"/>
+          <p:cNvSpPr/>
+          <p:nvPr/>
+        </p:nvSpPr>
+        <p:spPr>
+          <a:xfrm>
+            <a:off x="3275856" y="3356992"/>
+            <a:ext cx="360040" cy="360040"/>
+          </a:xfrm>
+          <a:prstGeom prst="triangle">
+            <a:avLst/>
+          </a:prstGeom>
+        </p:spPr>
+        <p:style>
+          <a:lnRef idx="2">
+            <a:schemeClr val="accent1">
+              <a:shade val="50000"/>
+            </a:schemeClr>
+          </a:lnRef>
+          <a:fillRef idx="1">
+            <a:schemeClr val="accent1"/>
+          </a:fillRef>
+          <a:effectRef idx="0">
+            <a:schemeClr val="accent1"/>
+          </a:effectRef>
+          <a:fontRef idx="minor">
+            <a:schemeClr val="lt1"/>
+          </a:fontRef>
+        </p:style>
+        <p:txBody>
+          <a:bodyPr rtlCol="0" anchor="ctr"/>
+          <a:lstStyle/>
+          <a:p>
+            <a:pPr algn="ctr"/>
+            <a:endParaRPr lang="id-ID"/>
+          </a:p>
+        </p:txBody>
+      </p:sp>
+      <p:cxnSp>
+        <p:nvCxnSpPr>
+          <p:cNvPr id="8" name="Straight Connector 7"/>
+          <p:cNvCxnSpPr>
+            <a:stCxn id="6" idx="3"/>
+          </p:cNvCxnSpPr>
+          <p:nvPr/>
+        </p:nvCxnSpPr>
+        <p:spPr>
+          <a:xfrm>
+            <a:off x="3455876" y="3717032"/>
+            <a:ext cx="36004" cy="1008112"/>
+          </a:xfrm>
+          <a:prstGeom prst="line">
+            <a:avLst/>
+          </a:prstGeom>
+        </p:spPr>
+        <p:style>
+          <a:lnRef idx="1">
+            <a:schemeClr val="accent1"/>
+          </a:lnRef>
+          <a:fillRef idx="0">
+            <a:schemeClr val="accent1"/>
+          </a:fillRef>
+          <a:effectRef idx="0">
+            <a:schemeClr val="accent1"/>
+          </a:effectRef>
+          <a:fontRef idx="minor">
+            <a:schemeClr val="tx1"/>
+          </a:fontRef>
+        </p:style>
+      </p:cxnSp>
     </p:spTree>
   </p:cSld>
   <p:clrMapOvr>

</xml_diff>